<commit_message>
add catch weighted model to the comparison
</commit_message>
<xml_diff>
--- a/Document/Results.pptx
+++ b/Document/Results.pptx
@@ -11,6 +11,8 @@
     <p:sldId id="259" r:id="rId5"/>
     <p:sldId id="261" r:id="rId6"/>
     <p:sldId id="260" r:id="rId7"/>
+    <p:sldId id="262" r:id="rId8"/>
+    <p:sldId id="263" r:id="rId9"/>
   </p:sldIdLst>
   <p:sldSz cx="12192000" cy="6858000"/>
   <p:notesSz cx="6858000" cy="9144000"/>
@@ -117,6 +119,143 @@
 </p:presentation>
 </file>
 
+<file path=ppt/revisionInfo.xml><?xml version="1.0" encoding="utf-8"?>
+<p1510:revInfo xmlns:a="http://schemas.openxmlformats.org/drawingml/2006/main" xmlns:r="http://schemas.openxmlformats.org/officeDocument/2006/relationships" xmlns:p1510="http://schemas.microsoft.com/office/powerpoint/2015/10/main">
+  <p1510:revLst>
+    <p1510:client id="{EB8337A6-F783-4048-B79A-5D6592A9B6CB}" v="7" dt="2022-03-01T18:34:59.222"/>
+  </p1510:revLst>
+</p1510:revInfo>
+</file>
+
+<file path=ppt/changesInfos/changesInfo1.xml><?xml version="1.0" encoding="utf-8"?>
+<pc:chgInfo xmlns:a="http://schemas.openxmlformats.org/drawingml/2006/main" xmlns:r="http://schemas.openxmlformats.org/officeDocument/2006/relationships" xmlns:ac="http://schemas.microsoft.com/office/drawing/2013/main/command" xmlns:pc="http://schemas.microsoft.com/office/powerpoint/2013/main/command">
+  <pc:docChgLst>
+    <pc:chgData name="Haikun Xu" userId="5497adfb-e7da-4e53-b8a0-6cfd25acadf2" providerId="ADAL" clId="{EB8337A6-F783-4048-B79A-5D6592A9B6CB}"/>
+    <pc:docChg chg="undo custSel addSld modSld">
+      <pc:chgData name="Haikun Xu" userId="5497adfb-e7da-4e53-b8a0-6cfd25acadf2" providerId="ADAL" clId="{EB8337A6-F783-4048-B79A-5D6592A9B6CB}" dt="2022-03-01T18:49:23.111" v="399" actId="20577"/>
+      <pc:docMkLst>
+        <pc:docMk/>
+      </pc:docMkLst>
+      <pc:sldChg chg="modSp mod">
+        <pc:chgData name="Haikun Xu" userId="5497adfb-e7da-4e53-b8a0-6cfd25acadf2" providerId="ADAL" clId="{EB8337A6-F783-4048-B79A-5D6592A9B6CB}" dt="2022-03-01T18:46:28.959" v="146" actId="114"/>
+        <pc:sldMkLst>
+          <pc:docMk/>
+          <pc:sldMk cId="1947829469" sldId="259"/>
+        </pc:sldMkLst>
+        <pc:spChg chg="mod">
+          <ac:chgData name="Haikun Xu" userId="5497adfb-e7da-4e53-b8a0-6cfd25acadf2" providerId="ADAL" clId="{EB8337A6-F783-4048-B79A-5D6592A9B6CB}" dt="2022-03-01T18:33:08.936" v="4" actId="404"/>
+          <ac:spMkLst>
+            <pc:docMk/>
+            <pc:sldMk cId="1947829469" sldId="259"/>
+            <ac:spMk id="2" creationId="{315C6C0D-84E4-4398-8A34-C43E914401F4}"/>
+          </ac:spMkLst>
+        </pc:spChg>
+        <pc:spChg chg="mod">
+          <ac:chgData name="Haikun Xu" userId="5497adfb-e7da-4e53-b8a0-6cfd25acadf2" providerId="ADAL" clId="{EB8337A6-F783-4048-B79A-5D6592A9B6CB}" dt="2022-03-01T18:46:28.959" v="146" actId="114"/>
+          <ac:spMkLst>
+            <pc:docMk/>
+            <pc:sldMk cId="1947829469" sldId="259"/>
+            <ac:spMk id="3" creationId="{2DB87C9E-5E54-47F4-8502-4468B1899C9B}"/>
+          </ac:spMkLst>
+        </pc:spChg>
+      </pc:sldChg>
+      <pc:sldChg chg="modSp mod">
+        <pc:chgData name="Haikun Xu" userId="5497adfb-e7da-4e53-b8a0-6cfd25acadf2" providerId="ADAL" clId="{EB8337A6-F783-4048-B79A-5D6592A9B6CB}" dt="2022-03-01T18:48:17.968" v="345" actId="20577"/>
+        <pc:sldMkLst>
+          <pc:docMk/>
+          <pc:sldMk cId="2039874651" sldId="260"/>
+        </pc:sldMkLst>
+        <pc:spChg chg="mod">
+          <ac:chgData name="Haikun Xu" userId="5497adfb-e7da-4e53-b8a0-6cfd25acadf2" providerId="ADAL" clId="{EB8337A6-F783-4048-B79A-5D6592A9B6CB}" dt="2022-03-01T18:46:40.852" v="156" actId="20577"/>
+          <ac:spMkLst>
+            <pc:docMk/>
+            <pc:sldMk cId="2039874651" sldId="260"/>
+            <ac:spMk id="2" creationId="{BB38A121-D6C8-48EF-9723-B4E2B053637C}"/>
+          </ac:spMkLst>
+        </pc:spChg>
+        <pc:spChg chg="mod">
+          <ac:chgData name="Haikun Xu" userId="5497adfb-e7da-4e53-b8a0-6cfd25acadf2" providerId="ADAL" clId="{EB8337A6-F783-4048-B79A-5D6592A9B6CB}" dt="2022-03-01T18:48:17.968" v="345" actId="20577"/>
+          <ac:spMkLst>
+            <pc:docMk/>
+            <pc:sldMk cId="2039874651" sldId="260"/>
+            <ac:spMk id="3" creationId="{6D01CF1A-F239-4E85-BB77-C5CA494871DA}"/>
+          </ac:spMkLst>
+        </pc:spChg>
+      </pc:sldChg>
+      <pc:sldChg chg="addSp delSp modSp mod">
+        <pc:chgData name="Haikun Xu" userId="5497adfb-e7da-4e53-b8a0-6cfd25acadf2" providerId="ADAL" clId="{EB8337A6-F783-4048-B79A-5D6592A9B6CB}" dt="2022-03-01T18:45:57.897" v="141" actId="1076"/>
+        <pc:sldMkLst>
+          <pc:docMk/>
+          <pc:sldMk cId="2872027279" sldId="261"/>
+        </pc:sldMkLst>
+        <pc:spChg chg="mod">
+          <ac:chgData name="Haikun Xu" userId="5497adfb-e7da-4e53-b8a0-6cfd25acadf2" providerId="ADAL" clId="{EB8337A6-F783-4048-B79A-5D6592A9B6CB}" dt="2022-03-01T18:33:17.360" v="9" actId="404"/>
+          <ac:spMkLst>
+            <pc:docMk/>
+            <pc:sldMk cId="2872027279" sldId="261"/>
+            <ac:spMk id="2" creationId="{315C6C0D-84E4-4398-8A34-C43E914401F4}"/>
+          </ac:spMkLst>
+        </pc:spChg>
+        <pc:graphicFrameChg chg="del mod modGraphic">
+          <ac:chgData name="Haikun Xu" userId="5497adfb-e7da-4e53-b8a0-6cfd25acadf2" providerId="ADAL" clId="{EB8337A6-F783-4048-B79A-5D6592A9B6CB}" dt="2022-03-01T18:34:42.475" v="64" actId="478"/>
+          <ac:graphicFrameMkLst>
+            <pc:docMk/>
+            <pc:sldMk cId="2872027279" sldId="261"/>
+            <ac:graphicFrameMk id="4" creationId="{C2A6E8E1-4F52-4285-889D-5A5B1C0FC24E}"/>
+          </ac:graphicFrameMkLst>
+        </pc:graphicFrameChg>
+        <pc:graphicFrameChg chg="add mod modGraphic">
+          <ac:chgData name="Haikun Xu" userId="5497adfb-e7da-4e53-b8a0-6cfd25acadf2" providerId="ADAL" clId="{EB8337A6-F783-4048-B79A-5D6592A9B6CB}" dt="2022-03-01T18:45:57.897" v="141" actId="1076"/>
+          <ac:graphicFrameMkLst>
+            <pc:docMk/>
+            <pc:sldMk cId="2872027279" sldId="261"/>
+            <ac:graphicFrameMk id="5" creationId="{50D14394-93B2-4BA5-A3D7-E819E7B75F22}"/>
+          </ac:graphicFrameMkLst>
+        </pc:graphicFrameChg>
+      </pc:sldChg>
+      <pc:sldChg chg="modSp new mod">
+        <pc:chgData name="Haikun Xu" userId="5497adfb-e7da-4e53-b8a0-6cfd25acadf2" providerId="ADAL" clId="{EB8337A6-F783-4048-B79A-5D6592A9B6CB}" dt="2022-03-01T18:48:32.329" v="362" actId="20577"/>
+        <pc:sldMkLst>
+          <pc:docMk/>
+          <pc:sldMk cId="341687223" sldId="262"/>
+        </pc:sldMkLst>
+        <pc:spChg chg="mod">
+          <ac:chgData name="Haikun Xu" userId="5497adfb-e7da-4e53-b8a0-6cfd25acadf2" providerId="ADAL" clId="{EB8337A6-F783-4048-B79A-5D6592A9B6CB}" dt="2022-03-01T18:48:32.329" v="362" actId="20577"/>
+          <ac:spMkLst>
+            <pc:docMk/>
+            <pc:sldMk cId="341687223" sldId="262"/>
+            <ac:spMk id="2" creationId="{46F354DB-4DFC-422C-94B3-F20E3606B5EA}"/>
+          </ac:spMkLst>
+        </pc:spChg>
+      </pc:sldChg>
+      <pc:sldChg chg="modSp new mod">
+        <pc:chgData name="Haikun Xu" userId="5497adfb-e7da-4e53-b8a0-6cfd25acadf2" providerId="ADAL" clId="{EB8337A6-F783-4048-B79A-5D6592A9B6CB}" dt="2022-03-01T18:49:23.111" v="399" actId="20577"/>
+        <pc:sldMkLst>
+          <pc:docMk/>
+          <pc:sldMk cId="1170450218" sldId="263"/>
+        </pc:sldMkLst>
+        <pc:spChg chg="mod">
+          <ac:chgData name="Haikun Xu" userId="5497adfb-e7da-4e53-b8a0-6cfd25acadf2" providerId="ADAL" clId="{EB8337A6-F783-4048-B79A-5D6592A9B6CB}" dt="2022-03-01T18:49:11.508" v="373" actId="20577"/>
+          <ac:spMkLst>
+            <pc:docMk/>
+            <pc:sldMk cId="1170450218" sldId="263"/>
+            <ac:spMk id="2" creationId="{E1258927-23B1-4FF7-B86B-61C17FC76DBE}"/>
+          </ac:spMkLst>
+        </pc:spChg>
+        <pc:spChg chg="mod">
+          <ac:chgData name="Haikun Xu" userId="5497adfb-e7da-4e53-b8a0-6cfd25acadf2" providerId="ADAL" clId="{EB8337A6-F783-4048-B79A-5D6592A9B6CB}" dt="2022-03-01T18:49:23.111" v="399" actId="20577"/>
+          <ac:spMkLst>
+            <pc:docMk/>
+            <pc:sldMk cId="1170450218" sldId="263"/>
+            <ac:spMk id="3" creationId="{AD9D78EE-87AC-4B39-80C6-834982631127}"/>
+          </ac:spMkLst>
+        </pc:spChg>
+      </pc:sldChg>
+    </pc:docChg>
+  </pc:docChgLst>
+</pc:chgInfo>
+</file>
+
 <file path=ppt/slideLayouts/slideLayout1.xml><?xml version="1.0" encoding="utf-8"?>
 <p:sldLayout xmlns:a="http://schemas.openxmlformats.org/drawingml/2006/main" xmlns:r="http://schemas.openxmlformats.org/officeDocument/2006/relationships" xmlns:p="http://schemas.openxmlformats.org/presentationml/2006/main" type="title" preserve="1">
   <p:cSld name="Title Slide">
@@ -264,7 +403,7 @@
           <a:p>
             <a:fld id="{444AB044-A65C-4299-8733-AC65705D17D7}" type="datetimeFigureOut">
               <a:rPr lang="en-US" smtClean="0"/>
-              <a:t>2/28/2022</a:t>
+              <a:t>3/1/2022</a:t>
             </a:fld>
             <a:endParaRPr lang="en-US"/>
           </a:p>
@@ -462,7 +601,7 @@
           <a:p>
             <a:fld id="{444AB044-A65C-4299-8733-AC65705D17D7}" type="datetimeFigureOut">
               <a:rPr lang="en-US" smtClean="0"/>
-              <a:t>2/28/2022</a:t>
+              <a:t>3/1/2022</a:t>
             </a:fld>
             <a:endParaRPr lang="en-US"/>
           </a:p>
@@ -670,7 +809,7 @@
           <a:p>
             <a:fld id="{444AB044-A65C-4299-8733-AC65705D17D7}" type="datetimeFigureOut">
               <a:rPr lang="en-US" smtClean="0"/>
-              <a:t>2/28/2022</a:t>
+              <a:t>3/1/2022</a:t>
             </a:fld>
             <a:endParaRPr lang="en-US"/>
           </a:p>
@@ -868,7 +1007,7 @@
           <a:p>
             <a:fld id="{444AB044-A65C-4299-8733-AC65705D17D7}" type="datetimeFigureOut">
               <a:rPr lang="en-US" smtClean="0"/>
-              <a:t>2/28/2022</a:t>
+              <a:t>3/1/2022</a:t>
             </a:fld>
             <a:endParaRPr lang="en-US"/>
           </a:p>
@@ -1143,7 +1282,7 @@
           <a:p>
             <a:fld id="{444AB044-A65C-4299-8733-AC65705D17D7}" type="datetimeFigureOut">
               <a:rPr lang="en-US" smtClean="0"/>
-              <a:t>2/28/2022</a:t>
+              <a:t>3/1/2022</a:t>
             </a:fld>
             <a:endParaRPr lang="en-US"/>
           </a:p>
@@ -1408,7 +1547,7 @@
           <a:p>
             <a:fld id="{444AB044-A65C-4299-8733-AC65705D17D7}" type="datetimeFigureOut">
               <a:rPr lang="en-US" smtClean="0"/>
-              <a:t>2/28/2022</a:t>
+              <a:t>3/1/2022</a:t>
             </a:fld>
             <a:endParaRPr lang="en-US"/>
           </a:p>
@@ -1820,7 +1959,7 @@
           <a:p>
             <a:fld id="{444AB044-A65C-4299-8733-AC65705D17D7}" type="datetimeFigureOut">
               <a:rPr lang="en-US" smtClean="0"/>
-              <a:t>2/28/2022</a:t>
+              <a:t>3/1/2022</a:t>
             </a:fld>
             <a:endParaRPr lang="en-US"/>
           </a:p>
@@ -1961,7 +2100,7 @@
           <a:p>
             <a:fld id="{444AB044-A65C-4299-8733-AC65705D17D7}" type="datetimeFigureOut">
               <a:rPr lang="en-US" smtClean="0"/>
-              <a:t>2/28/2022</a:t>
+              <a:t>3/1/2022</a:t>
             </a:fld>
             <a:endParaRPr lang="en-US"/>
           </a:p>
@@ -2074,7 +2213,7 @@
           <a:p>
             <a:fld id="{444AB044-A65C-4299-8733-AC65705D17D7}" type="datetimeFigureOut">
               <a:rPr lang="en-US" smtClean="0"/>
-              <a:t>2/28/2022</a:t>
+              <a:t>3/1/2022</a:t>
             </a:fld>
             <a:endParaRPr lang="en-US"/>
           </a:p>
@@ -2385,7 +2524,7 @@
           <a:p>
             <a:fld id="{444AB044-A65C-4299-8733-AC65705D17D7}" type="datetimeFigureOut">
               <a:rPr lang="en-US" smtClean="0"/>
-              <a:t>2/28/2022</a:t>
+              <a:t>3/1/2022</a:t>
             </a:fld>
             <a:endParaRPr lang="en-US"/>
           </a:p>
@@ -2673,7 +2812,7 @@
           <a:p>
             <a:fld id="{444AB044-A65C-4299-8733-AC65705D17D7}" type="datetimeFigureOut">
               <a:rPr lang="en-US" smtClean="0"/>
-              <a:t>2/28/2022</a:t>
+              <a:t>3/1/2022</a:t>
             </a:fld>
             <a:endParaRPr lang="en-US"/>
           </a:p>
@@ -2914,7 +3053,7 @@
           <a:p>
             <a:fld id="{444AB044-A65C-4299-8733-AC65705D17D7}" type="datetimeFigureOut">
               <a:rPr lang="en-US" smtClean="0"/>
-              <a:t>2/28/2022</a:t>
+              <a:t>3/1/2022</a:t>
             </a:fld>
             <a:endParaRPr lang="en-US"/>
           </a:p>
@@ -3701,19 +3840,21 @@
         </p:nvSpPr>
         <p:spPr/>
         <p:txBody>
-          <a:bodyPr/>
-          <a:lstStyle/>
-          <a:p>
-            <a:r>
-              <a:rPr lang="en-US" dirty="0"/>
-              <a:t>Two models are compared for the 1</a:t>
-            </a:r>
-            <a:r>
-              <a:rPr lang="en-US" baseline="30000" dirty="0"/>
+          <a:bodyPr>
+            <a:normAutofit/>
+          </a:bodyPr>
+          <a:lstStyle/>
+          <a:p>
+            <a:r>
+              <a:rPr lang="en-US" sz="4000" dirty="0"/>
+              <a:t>Three models are compared for the 1</a:t>
+            </a:r>
+            <a:r>
+              <a:rPr lang="en-US" sz="4000" baseline="30000" dirty="0"/>
               <a:t>st</a:t>
             </a:r>
             <a:r>
-              <a:rPr lang="en-US" dirty="0"/>
+              <a:rPr lang="en-US" sz="4000" dirty="0"/>
               <a:t> replicate</a:t>
             </a:r>
           </a:p>
@@ -3793,7 +3934,15 @@
           <a:p>
             <a:r>
               <a:rPr lang="en-US" dirty="0"/>
-              <a:t>index CV is time-varying with a mean of 0.1 (still seems to be too large)</a:t>
+              <a:t>index CV is time-varying with a mean of 0.1 (</a:t>
+            </a:r>
+            <a:r>
+              <a:rPr lang="en-US" i="1" dirty="0"/>
+              <a:t>still seems to be too large</a:t>
+            </a:r>
+            <a:r>
+              <a:rPr lang="en-US" dirty="0"/>
+              <a:t>)</a:t>
             </a:r>
           </a:p>
           <a:p>
@@ -3866,47 +4015,49 @@
         </p:nvSpPr>
         <p:spPr/>
         <p:txBody>
-          <a:bodyPr/>
-          <a:lstStyle/>
-          <a:p>
-            <a:r>
-              <a:rPr lang="en-US" dirty="0"/>
-              <a:t>Two models are compared for the 1</a:t>
-            </a:r>
-            <a:r>
-              <a:rPr lang="en-US" baseline="30000" dirty="0"/>
-              <a:t>st</a:t>
-            </a:r>
-            <a:r>
-              <a:rPr lang="en-US" dirty="0"/>
-              <a:t> replicate</a:t>
-            </a:r>
-          </a:p>
-        </p:txBody>
-      </p:sp>
-      <p:sp>
-        <p:nvSpPr>
-          <p:cNvPr id="3" name="Content Placeholder 2">
-            <a:extLst>
-              <a:ext uri="{FF2B5EF4-FFF2-40B4-BE49-F238E27FC236}">
-                <a16:creationId xmlns:a16="http://schemas.microsoft.com/office/drawing/2014/main" id="{2DB87C9E-5E54-47F4-8502-4468B1899C9B}"/>
-              </a:ext>
-            </a:extLst>
-          </p:cNvPr>
-          <p:cNvSpPr>
-            <a:spLocks noGrp="1"/>
-          </p:cNvSpPr>
-          <p:nvPr>
-            <p:ph idx="1"/>
-          </p:nvPr>
-        </p:nvSpPr>
-        <p:spPr/>
-        <p:txBody>
           <a:bodyPr>
             <a:normAutofit/>
           </a:bodyPr>
           <a:lstStyle/>
           <a:p>
+            <a:r>
+              <a:rPr lang="en-US" sz="4000" dirty="0"/>
+              <a:t>Three models are compared for the 1</a:t>
+            </a:r>
+            <a:r>
+              <a:rPr lang="en-US" sz="4000" baseline="30000" dirty="0"/>
+              <a:t>st</a:t>
+            </a:r>
+            <a:r>
+              <a:rPr lang="en-US" sz="4000" dirty="0"/>
+              <a:t> replicate</a:t>
+            </a:r>
+          </a:p>
+        </p:txBody>
+      </p:sp>
+      <p:sp>
+        <p:nvSpPr>
+          <p:cNvPr id="3" name="Content Placeholder 2">
+            <a:extLst>
+              <a:ext uri="{FF2B5EF4-FFF2-40B4-BE49-F238E27FC236}">
+                <a16:creationId xmlns:a16="http://schemas.microsoft.com/office/drawing/2014/main" id="{2DB87C9E-5E54-47F4-8502-4468B1899C9B}"/>
+              </a:ext>
+            </a:extLst>
+          </p:cNvPr>
+          <p:cNvSpPr>
+            <a:spLocks noGrp="1"/>
+          </p:cNvSpPr>
+          <p:nvPr>
+            <p:ph idx="1"/>
+          </p:nvPr>
+        </p:nvSpPr>
+        <p:spPr/>
+        <p:txBody>
+          <a:bodyPr>
+            <a:normAutofit/>
+          </a:bodyPr>
+          <a:lstStyle/>
+          <a:p>
             <a:pPr marL="0" indent="0">
               <a:buNone/>
             </a:pPr>
@@ -3923,122 +4074,6 @@
           </a:p>
         </p:txBody>
       </p:sp>
-      <p:graphicFrame>
-        <p:nvGraphicFramePr>
-          <p:cNvPr id="4" name="Table 4">
-            <a:extLst>
-              <a:ext uri="{FF2B5EF4-FFF2-40B4-BE49-F238E27FC236}">
-                <a16:creationId xmlns:a16="http://schemas.microsoft.com/office/drawing/2014/main" id="{C2A6E8E1-4F52-4285-889D-5A5B1C0FC24E}"/>
-              </a:ext>
-            </a:extLst>
-          </p:cNvPr>
-          <p:cNvGraphicFramePr>
-            <a:graphicFrameLocks noGrp="1"/>
-          </p:cNvGraphicFramePr>
-          <p:nvPr>
-            <p:extLst>
-              <p:ext uri="{D42A27DB-BD31-4B8C-83A1-F6EECF244321}">
-                <p14:modId xmlns:p14="http://schemas.microsoft.com/office/powerpoint/2010/main" val="66653602"/>
-              </p:ext>
-            </p:extLst>
-          </p:nvPr>
-        </p:nvGraphicFramePr>
-        <p:xfrm>
-          <a:off x="3386667" y="2414905"/>
-          <a:ext cx="5418666" cy="1010920"/>
-        </p:xfrm>
-        <a:graphic>
-          <a:graphicData uri="http://schemas.openxmlformats.org/drawingml/2006/table">
-            <a:tbl>
-              <a:tblPr firstRow="1" bandRow="1">
-                <a:tableStyleId>{5C22544A-7EE6-4342-B048-85BDC9FD1C3A}</a:tableStyleId>
-              </a:tblPr>
-              <a:tblGrid>
-                <a:gridCol w="2709333">
-                  <a:extLst>
-                    <a:ext uri="{9D8B030D-6E8A-4147-A177-3AD203B41FA5}">
-                      <a16:colId xmlns:a16="http://schemas.microsoft.com/office/drawing/2014/main" val="3730494045"/>
-                    </a:ext>
-                  </a:extLst>
-                </a:gridCol>
-                <a:gridCol w="2709333">
-                  <a:extLst>
-                    <a:ext uri="{9D8B030D-6E8A-4147-A177-3AD203B41FA5}">
-                      <a16:colId xmlns:a16="http://schemas.microsoft.com/office/drawing/2014/main" val="1168128691"/>
-                    </a:ext>
-                  </a:extLst>
-                </a:gridCol>
-              </a:tblGrid>
-              <a:tr h="370840">
-                <a:tc>
-                  <a:txBody>
-                    <a:bodyPr/>
-                    <a:lstStyle/>
-                    <a:p>
-                      <a:r>
-                        <a:rPr lang="en-US" dirty="0"/>
-                        <a:t>Model1</a:t>
-                      </a:r>
-                    </a:p>
-                  </a:txBody>
-                  <a:tcPr/>
-                </a:tc>
-                <a:tc>
-                  <a:txBody>
-                    <a:bodyPr/>
-                    <a:lstStyle/>
-                    <a:p>
-                      <a:r>
-                        <a:rPr lang="en-US" dirty="0"/>
-                        <a:t>Model2</a:t>
-                      </a:r>
-                    </a:p>
-                  </a:txBody>
-                  <a:tcPr/>
-                </a:tc>
-                <a:extLst>
-                  <a:ext uri="{0D108BD9-81ED-4DB2-BD59-A6C34878D82A}">
-                    <a16:rowId xmlns:a16="http://schemas.microsoft.com/office/drawing/2014/main" val="3587896739"/>
-                  </a:ext>
-                </a:extLst>
-              </a:tr>
-              <a:tr h="370840">
-                <a:tc>
-                  <a:txBody>
-                    <a:bodyPr/>
-                    <a:lstStyle/>
-                    <a:p>
-                      <a:r>
-                        <a:rPr lang="en-US" dirty="0"/>
-                        <a:t>Pre-defined (default) fisheries </a:t>
-                      </a:r>
-                    </a:p>
-                  </a:txBody>
-                  <a:tcPr/>
-                </a:tc>
-                <a:tc>
-                  <a:txBody>
-                    <a:bodyPr/>
-                    <a:lstStyle/>
-                    <a:p>
-                      <a:r>
-                        <a:rPr lang="en-US" dirty="0"/>
-                        <a:t>Regression tree-defined PS and LL fisheries</a:t>
-                      </a:r>
-                    </a:p>
-                  </a:txBody>
-                  <a:tcPr/>
-                </a:tc>
-                <a:extLst>
-                  <a:ext uri="{0D108BD9-81ED-4DB2-BD59-A6C34878D82A}">
-                    <a16:rowId xmlns:a16="http://schemas.microsoft.com/office/drawing/2014/main" val="1263490187"/>
-                  </a:ext>
-                </a:extLst>
-              </a:tr>
-            </a:tbl>
-          </a:graphicData>
-        </a:graphic>
-      </p:graphicFrame>
       <p:pic>
         <p:nvPicPr>
           <p:cNvPr id="6" name="Picture 5">
@@ -4175,6 +4210,271 @@
           </a:p>
         </p:txBody>
       </p:sp>
+      <p:graphicFrame>
+        <p:nvGraphicFramePr>
+          <p:cNvPr id="5" name="Table 6">
+            <a:extLst>
+              <a:ext uri="{FF2B5EF4-FFF2-40B4-BE49-F238E27FC236}">
+                <a16:creationId xmlns:a16="http://schemas.microsoft.com/office/drawing/2014/main" id="{50D14394-93B2-4BA5-A3D7-E819E7B75F22}"/>
+              </a:ext>
+            </a:extLst>
+          </p:cNvPr>
+          <p:cNvGraphicFramePr>
+            <a:graphicFrameLocks noGrp="1"/>
+          </p:cNvGraphicFramePr>
+          <p:nvPr>
+            <p:extLst>
+              <p:ext uri="{D42A27DB-BD31-4B8C-83A1-F6EECF244321}">
+                <p14:modId xmlns:p14="http://schemas.microsoft.com/office/powerpoint/2010/main" val="20427786"/>
+              </p:ext>
+            </p:extLst>
+          </p:nvPr>
+        </p:nvGraphicFramePr>
+        <p:xfrm>
+          <a:off x="3096525" y="2112662"/>
+          <a:ext cx="8127999" cy="1651000"/>
+        </p:xfrm>
+        <a:graphic>
+          <a:graphicData uri="http://schemas.openxmlformats.org/drawingml/2006/table">
+            <a:tbl>
+              <a:tblPr firstRow="1" bandRow="1">
+                <a:tableStyleId>{5C22544A-7EE6-4342-B048-85BDC9FD1C3A}</a:tableStyleId>
+              </a:tblPr>
+              <a:tblGrid>
+                <a:gridCol w="2709333">
+                  <a:extLst>
+                    <a:ext uri="{9D8B030D-6E8A-4147-A177-3AD203B41FA5}">
+                      <a16:colId xmlns:a16="http://schemas.microsoft.com/office/drawing/2014/main" val="1944336063"/>
+                    </a:ext>
+                  </a:extLst>
+                </a:gridCol>
+                <a:gridCol w="2709333">
+                  <a:extLst>
+                    <a:ext uri="{9D8B030D-6E8A-4147-A177-3AD203B41FA5}">
+                      <a16:colId xmlns:a16="http://schemas.microsoft.com/office/drawing/2014/main" val="1911345061"/>
+                    </a:ext>
+                  </a:extLst>
+                </a:gridCol>
+                <a:gridCol w="2709333">
+                  <a:extLst>
+                    <a:ext uri="{9D8B030D-6E8A-4147-A177-3AD203B41FA5}">
+                      <a16:colId xmlns:a16="http://schemas.microsoft.com/office/drawing/2014/main" val="2439143061"/>
+                    </a:ext>
+                  </a:extLst>
+                </a:gridCol>
+              </a:tblGrid>
+              <a:tr h="370840">
+                <a:tc>
+                  <a:txBody>
+                    <a:bodyPr/>
+                    <a:lstStyle/>
+                    <a:p>
+                      <a:r>
+                        <a:rPr lang="en-US" dirty="0">
+                          <a:solidFill>
+                            <a:srgbClr val="FF0000"/>
+                          </a:solidFill>
+                        </a:rPr>
+                        <a:t>Model1</a:t>
+                      </a:r>
+                    </a:p>
+                  </a:txBody>
+                  <a:tcPr/>
+                </a:tc>
+                <a:tc>
+                  <a:txBody>
+                    <a:bodyPr/>
+                    <a:lstStyle/>
+                    <a:p>
+                      <a:r>
+                        <a:rPr lang="en-US" dirty="0">
+                          <a:solidFill>
+                            <a:srgbClr val="00B050"/>
+                          </a:solidFill>
+                        </a:rPr>
+                        <a:t>Model2</a:t>
+                      </a:r>
+                    </a:p>
+                  </a:txBody>
+                  <a:tcPr/>
+                </a:tc>
+                <a:tc>
+                  <a:txBody>
+                    <a:bodyPr/>
+                    <a:lstStyle/>
+                    <a:p>
+                      <a:r>
+                        <a:rPr lang="en-US" dirty="0">
+                          <a:solidFill>
+                            <a:srgbClr val="00B050"/>
+                          </a:solidFill>
+                        </a:rPr>
+                        <a:t>Model3</a:t>
+                      </a:r>
+                    </a:p>
+                  </a:txBody>
+                  <a:tcPr/>
+                </a:tc>
+                <a:extLst>
+                  <a:ext uri="{0D108BD9-81ED-4DB2-BD59-A6C34878D82A}">
+                    <a16:rowId xmlns:a16="http://schemas.microsoft.com/office/drawing/2014/main" val="711262895"/>
+                  </a:ext>
+                </a:extLst>
+              </a:tr>
+              <a:tr h="370840">
+                <a:tc>
+                  <a:txBody>
+                    <a:bodyPr/>
+                    <a:lstStyle/>
+                    <a:p>
+                      <a:r>
+                        <a:rPr lang="en-US" dirty="0">
+                          <a:solidFill>
+                            <a:srgbClr val="FF0000"/>
+                          </a:solidFill>
+                        </a:rPr>
+                        <a:t>Pre-defined (default) fisheries</a:t>
+                      </a:r>
+                    </a:p>
+                  </a:txBody>
+                  <a:tcPr/>
+                </a:tc>
+                <a:tc>
+                  <a:txBody>
+                    <a:bodyPr/>
+                    <a:lstStyle/>
+                    <a:p>
+                      <a:r>
+                        <a:rPr lang="en-US" dirty="0">
+                          <a:solidFill>
+                            <a:srgbClr val="00B050"/>
+                          </a:solidFill>
+                        </a:rPr>
+                        <a:t>Regression tree-defined PS and LL fisheries</a:t>
+                      </a:r>
+                    </a:p>
+                  </a:txBody>
+                  <a:tcPr/>
+                </a:tc>
+                <a:tc>
+                  <a:txBody>
+                    <a:bodyPr/>
+                    <a:lstStyle/>
+                    <a:p>
+                      <a:pPr marL="0" marR="0" lvl="0" indent="0" algn="l" defTabSz="914400" rtl="0" eaLnBrk="1" fontAlgn="auto" latinLnBrk="0" hangingPunct="1">
+                        <a:lnSpc>
+                          <a:spcPct val="100000"/>
+                        </a:lnSpc>
+                        <a:spcBef>
+                          <a:spcPts val="0"/>
+                        </a:spcBef>
+                        <a:spcAft>
+                          <a:spcPts val="0"/>
+                        </a:spcAft>
+                        <a:buClrTx/>
+                        <a:buSzTx/>
+                        <a:buFontTx/>
+                        <a:buNone/>
+                        <a:tabLst/>
+                        <a:defRPr/>
+                      </a:pPr>
+                      <a:r>
+                        <a:rPr lang="en-US" dirty="0">
+                          <a:solidFill>
+                            <a:srgbClr val="00B050"/>
+                          </a:solidFill>
+                        </a:rPr>
+                        <a:t>Regression tree-defined PS and LL fisheries</a:t>
+                      </a:r>
+                    </a:p>
+                  </a:txBody>
+                  <a:tcPr/>
+                </a:tc>
+                <a:extLst>
+                  <a:ext uri="{0D108BD9-81ED-4DB2-BD59-A6C34878D82A}">
+                    <a16:rowId xmlns:a16="http://schemas.microsoft.com/office/drawing/2014/main" val="228637272"/>
+                  </a:ext>
+                </a:extLst>
+              </a:tr>
+              <a:tr h="370840">
+                <a:tc>
+                  <a:txBody>
+                    <a:bodyPr/>
+                    <a:lstStyle/>
+                    <a:p>
+                      <a:r>
+                        <a:rPr lang="en-US" dirty="0">
+                          <a:solidFill>
+                            <a:srgbClr val="FF0000"/>
+                          </a:solidFill>
+                        </a:rPr>
+                        <a:t>All fisheries’ comps are sample weighted</a:t>
+                      </a:r>
+                    </a:p>
+                  </a:txBody>
+                  <a:tcPr/>
+                </a:tc>
+                <a:tc>
+                  <a:txBody>
+                    <a:bodyPr/>
+                    <a:lstStyle/>
+                    <a:p>
+                      <a:pPr marL="0" marR="0" lvl="0" indent="0" algn="l" defTabSz="914400" rtl="0" eaLnBrk="1" fontAlgn="auto" latinLnBrk="0" hangingPunct="1">
+                        <a:lnSpc>
+                          <a:spcPct val="100000"/>
+                        </a:lnSpc>
+                        <a:spcBef>
+                          <a:spcPts val="0"/>
+                        </a:spcBef>
+                        <a:spcAft>
+                          <a:spcPts val="0"/>
+                        </a:spcAft>
+                        <a:buClrTx/>
+                        <a:buSzTx/>
+                        <a:buFontTx/>
+                        <a:buNone/>
+                        <a:tabLst/>
+                        <a:defRPr/>
+                      </a:pPr>
+                      <a:r>
+                        <a:rPr lang="en-US" dirty="0">
+                          <a:solidFill>
+                            <a:srgbClr val="00B050"/>
+                          </a:solidFill>
+                        </a:rPr>
+                        <a:t>All fisheries’ comps are sample weighted</a:t>
+                      </a:r>
+                    </a:p>
+                  </a:txBody>
+                  <a:tcPr/>
+                </a:tc>
+                <a:tc>
+                  <a:txBody>
+                    <a:bodyPr/>
+                    <a:lstStyle/>
+                    <a:p>
+                      <a:r>
+                        <a:rPr lang="en-US" dirty="0">
+                          <a:solidFill>
+                            <a:srgbClr val="00B050"/>
+                          </a:solidFill>
+                        </a:rPr>
+                        <a:t>PS and LL fisheries’ comps are catch weighted</a:t>
+                      </a:r>
+                    </a:p>
+                  </a:txBody>
+                  <a:tcPr/>
+                </a:tc>
+                <a:extLst>
+                  <a:ext uri="{0D108BD9-81ED-4DB2-BD59-A6C34878D82A}">
+                    <a16:rowId xmlns:a16="http://schemas.microsoft.com/office/drawing/2014/main" val="1865106048"/>
+                  </a:ext>
+                </a:extLst>
+              </a:tr>
+            </a:tbl>
+          </a:graphicData>
+        </a:graphic>
+      </p:graphicFrame>
     </p:spTree>
     <p:extLst>
       <p:ext uri="{BB962C8B-B14F-4D97-AF65-F5344CB8AC3E}">
@@ -4226,7 +4526,10 @@
           <a:bodyPr/>
           <a:lstStyle/>
           <a:p>
-            <a:endParaRPr lang="en-US"/>
+            <a:r>
+              <a:rPr lang="en-US" dirty="0"/>
+              <a:t>SS runs </a:t>
+            </a:r>
           </a:p>
         </p:txBody>
       </p:sp>
@@ -4251,7 +4554,43 @@
           <a:bodyPr/>
           <a:lstStyle/>
           <a:p>
-            <a:endParaRPr lang="en-US"/>
+            <a:pPr marL="0" indent="0">
+              <a:buNone/>
+            </a:pPr>
+            <a:r>
+              <a:rPr lang="en-US" dirty="0"/>
+              <a:t>Each model is run for three times:</a:t>
+            </a:r>
+          </a:p>
+          <a:p>
+            <a:pPr marL="514350" indent="-514350">
+              <a:buFont typeface="+mj-lt"/>
+              <a:buAutoNum type="arabicPeriod"/>
+            </a:pPr>
+            <a:r>
+              <a:rPr lang="en-US" dirty="0"/>
+              <a:t>Run with LF weight = 1</a:t>
+            </a:r>
+          </a:p>
+          <a:p>
+            <a:pPr marL="514350" indent="-514350">
+              <a:buFont typeface="+mj-lt"/>
+              <a:buAutoNum type="arabicPeriod"/>
+            </a:pPr>
+            <a:r>
+              <a:rPr lang="en-US" dirty="0"/>
+              <a:t>Run with LF weight = Francis</a:t>
+            </a:r>
+          </a:p>
+          <a:p>
+            <a:pPr marL="514350" indent="-514350">
+              <a:buFont typeface="+mj-lt"/>
+              <a:buAutoNum type="arabicPeriod"/>
+            </a:pPr>
+            <a:r>
+              <a:rPr lang="en-US" dirty="0"/>
+              <a:t>Run with LF weight = Francis and suggested recruitment bias adjustment</a:t>
+            </a:r>
           </a:p>
         </p:txBody>
       </p:sp>
@@ -4259,6 +4598,179 @@
     <p:extLst>
       <p:ext uri="{BB962C8B-B14F-4D97-AF65-F5344CB8AC3E}">
         <p14:creationId xmlns:p14="http://schemas.microsoft.com/office/powerpoint/2010/main" val="2039874651"/>
+      </p:ext>
+    </p:extLst>
+  </p:cSld>
+  <p:clrMapOvr>
+    <a:masterClrMapping/>
+  </p:clrMapOvr>
+</p:sld>
+</file>
+
+<file path=ppt/slides/slide7.xml><?xml version="1.0" encoding="utf-8"?>
+<p:sld xmlns:a="http://schemas.openxmlformats.org/drawingml/2006/main" xmlns:r="http://schemas.openxmlformats.org/officeDocument/2006/relationships" xmlns:p="http://schemas.openxmlformats.org/presentationml/2006/main">
+  <p:cSld>
+    <p:spTree>
+      <p:nvGrpSpPr>
+        <p:cNvPr id="1" name=""/>
+        <p:cNvGrpSpPr/>
+        <p:nvPr/>
+      </p:nvGrpSpPr>
+      <p:grpSpPr>
+        <a:xfrm>
+          <a:off x="0" y="0"/>
+          <a:ext cx="0" cy="0"/>
+          <a:chOff x="0" y="0"/>
+          <a:chExt cx="0" cy="0"/>
+        </a:xfrm>
+      </p:grpSpPr>
+      <p:sp>
+        <p:nvSpPr>
+          <p:cNvPr id="2" name="Title 1">
+            <a:extLst>
+              <a:ext uri="{FF2B5EF4-FFF2-40B4-BE49-F238E27FC236}">
+                <a16:creationId xmlns:a16="http://schemas.microsoft.com/office/drawing/2014/main" id="{46F354DB-4DFC-422C-94B3-F20E3606B5EA}"/>
+              </a:ext>
+            </a:extLst>
+          </p:cNvPr>
+          <p:cNvSpPr>
+            <a:spLocks noGrp="1"/>
+          </p:cNvSpPr>
+          <p:nvPr>
+            <p:ph type="title"/>
+          </p:nvPr>
+        </p:nvSpPr>
+        <p:spPr/>
+        <p:txBody>
+          <a:bodyPr/>
+          <a:lstStyle/>
+          <a:p>
+            <a:r>
+              <a:rPr lang="en-US" dirty="0"/>
+              <a:t>Comparison</a:t>
+            </a:r>
+          </a:p>
+        </p:txBody>
+      </p:sp>
+      <p:sp>
+        <p:nvSpPr>
+          <p:cNvPr id="3" name="Content Placeholder 2">
+            <a:extLst>
+              <a:ext uri="{FF2B5EF4-FFF2-40B4-BE49-F238E27FC236}">
+                <a16:creationId xmlns:a16="http://schemas.microsoft.com/office/drawing/2014/main" id="{B0D38635-6C97-44EA-8677-62B6BBBAB018}"/>
+              </a:ext>
+            </a:extLst>
+          </p:cNvPr>
+          <p:cNvSpPr>
+            <a:spLocks noGrp="1"/>
+          </p:cNvSpPr>
+          <p:nvPr>
+            <p:ph idx="1"/>
+          </p:nvPr>
+        </p:nvSpPr>
+        <p:spPr/>
+        <p:txBody>
+          <a:bodyPr/>
+          <a:lstStyle/>
+          <a:p>
+            <a:endParaRPr lang="en-US"/>
+          </a:p>
+        </p:txBody>
+      </p:sp>
+    </p:spTree>
+    <p:extLst>
+      <p:ext uri="{BB962C8B-B14F-4D97-AF65-F5344CB8AC3E}">
+        <p14:creationId xmlns:p14="http://schemas.microsoft.com/office/powerpoint/2010/main" val="341687223"/>
+      </p:ext>
+    </p:extLst>
+  </p:cSld>
+  <p:clrMapOvr>
+    <a:masterClrMapping/>
+  </p:clrMapOvr>
+</p:sld>
+</file>
+
+<file path=ppt/slides/slide8.xml><?xml version="1.0" encoding="utf-8"?>
+<p:sld xmlns:a="http://schemas.openxmlformats.org/drawingml/2006/main" xmlns:r="http://schemas.openxmlformats.org/officeDocument/2006/relationships" xmlns:p="http://schemas.openxmlformats.org/presentationml/2006/main">
+  <p:cSld>
+    <p:spTree>
+      <p:nvGrpSpPr>
+        <p:cNvPr id="1" name=""/>
+        <p:cNvGrpSpPr/>
+        <p:nvPr/>
+      </p:nvGrpSpPr>
+      <p:grpSpPr>
+        <a:xfrm>
+          <a:off x="0" y="0"/>
+          <a:ext cx="0" cy="0"/>
+          <a:chOff x="0" y="0"/>
+          <a:chExt cx="0" cy="0"/>
+        </a:xfrm>
+      </p:grpSpPr>
+      <p:sp>
+        <p:nvSpPr>
+          <p:cNvPr id="2" name="Title 1">
+            <a:extLst>
+              <a:ext uri="{FF2B5EF4-FFF2-40B4-BE49-F238E27FC236}">
+                <a16:creationId xmlns:a16="http://schemas.microsoft.com/office/drawing/2014/main" id="{E1258927-23B1-4FF7-B86B-61C17FC76DBE}"/>
+              </a:ext>
+            </a:extLst>
+          </p:cNvPr>
+          <p:cNvSpPr>
+            <a:spLocks noGrp="1"/>
+          </p:cNvSpPr>
+          <p:nvPr>
+            <p:ph type="title"/>
+          </p:nvPr>
+        </p:nvSpPr>
+        <p:spPr/>
+        <p:txBody>
+          <a:bodyPr/>
+          <a:lstStyle/>
+          <a:p>
+            <a:r>
+              <a:rPr lang="en-US" dirty="0"/>
+              <a:t>Discussion</a:t>
+            </a:r>
+          </a:p>
+        </p:txBody>
+      </p:sp>
+      <p:sp>
+        <p:nvSpPr>
+          <p:cNvPr id="3" name="Content Placeholder 2">
+            <a:extLst>
+              <a:ext uri="{FF2B5EF4-FFF2-40B4-BE49-F238E27FC236}">
+                <a16:creationId xmlns:a16="http://schemas.microsoft.com/office/drawing/2014/main" id="{AD9D78EE-87AC-4B39-80C6-834982631127}"/>
+              </a:ext>
+            </a:extLst>
+          </p:cNvPr>
+          <p:cNvSpPr>
+            <a:spLocks noGrp="1"/>
+          </p:cNvSpPr>
+          <p:nvPr>
+            <p:ph idx="1"/>
+          </p:nvPr>
+        </p:nvSpPr>
+        <p:spPr/>
+        <p:txBody>
+          <a:bodyPr/>
+          <a:lstStyle/>
+          <a:p>
+            <a:r>
+              <a:rPr lang="en-US" dirty="0"/>
+              <a:t>How to </a:t>
+            </a:r>
+            <a:r>
+              <a:rPr lang="en-US"/>
+              <a:t>specify index CV?</a:t>
+            </a:r>
+          </a:p>
+        </p:txBody>
+      </p:sp>
+    </p:spTree>
+    <p:extLst>
+      <p:ext uri="{BB962C8B-B14F-4D97-AF65-F5344CB8AC3E}">
+        <p14:creationId xmlns:p14="http://schemas.microsoft.com/office/powerpoint/2010/main" val="1170450218"/>
       </p:ext>
     </p:extLst>
   </p:cSld>

</xml_diff>